<commit_message>
MaaS and resourses. 16Mar17 update.
</commit_message>
<xml_diff>
--- a/Forum_16Mar2017/DXRoadmaps.pptx
+++ b/Forum_16Mar2017/DXRoadmaps.pptx
@@ -207,7 +207,7 @@
           <a:p>
             <a:fld id="{D4C840F1-0C8E-4C76-A681-3DDE5DB343B6}" type="datetimeFigureOut">
               <a:rPr lang="ru-RU"/>
-              <a:t>06.03.2017</a:t>
+              <a:t>09.03.2017</a:t>
             </a:fld>
             <a:endParaRPr lang="ru-RU"/>
           </a:p>
@@ -623,7 +623,7 @@
           <a:p>
             <a:fld id="{CB06A0B6-F5BD-443D-BE01-CCD0808C29C5}" type="slidenum">
               <a:rPr lang="ru-RU"/>
-              <a:t>9</a:t>
+              <a:t>10</a:t>
             </a:fld>
             <a:endParaRPr lang="ru-RU"/>
           </a:p>
@@ -707,7 +707,7 @@
           <a:p>
             <a:fld id="{CB06A0B6-F5BD-443D-BE01-CCD0808C29C5}" type="slidenum">
               <a:rPr lang="ru-RU"/>
-              <a:t>10</a:t>
+              <a:t>11</a:t>
             </a:fld>
             <a:endParaRPr lang="ru-RU"/>
           </a:p>
@@ -875,7 +875,7 @@
           <a:p>
             <a:fld id="{CB06A0B6-F5BD-443D-BE01-CCD0808C29C5}" type="slidenum">
               <a:rPr lang="ru-RU"/>
-              <a:t>‹#›</a:t>
+              <a:t>3</a:t>
             </a:fld>
             <a:endParaRPr lang="ru-RU"/>
           </a:p>
@@ -959,7 +959,7 @@
           <a:p>
             <a:fld id="{CB06A0B6-F5BD-443D-BE01-CCD0808C29C5}" type="slidenum">
               <a:rPr lang="ru-RU"/>
-              <a:t>3</a:t>
+              <a:t>4</a:t>
             </a:fld>
             <a:endParaRPr lang="ru-RU"/>
           </a:p>
@@ -1043,7 +1043,7 @@
           <a:p>
             <a:fld id="{CB06A0B6-F5BD-443D-BE01-CCD0808C29C5}" type="slidenum">
               <a:rPr lang="ru-RU"/>
-              <a:t>4</a:t>
+              <a:t>5</a:t>
             </a:fld>
             <a:endParaRPr lang="ru-RU"/>
           </a:p>
@@ -1127,7 +1127,7 @@
           <a:p>
             <a:fld id="{CB06A0B6-F5BD-443D-BE01-CCD0808C29C5}" type="slidenum">
               <a:rPr lang="ru-RU"/>
-              <a:t>5</a:t>
+              <a:t>6</a:t>
             </a:fld>
             <a:endParaRPr lang="ru-RU"/>
           </a:p>
@@ -1211,7 +1211,7 @@
           <a:p>
             <a:fld id="{CB06A0B6-F5BD-443D-BE01-CCD0808C29C5}" type="slidenum">
               <a:rPr lang="ru-RU"/>
-              <a:t>6</a:t>
+              <a:t>7</a:t>
             </a:fld>
             <a:endParaRPr lang="ru-RU"/>
           </a:p>
@@ -1295,7 +1295,7 @@
           <a:p>
             <a:fld id="{CB06A0B6-F5BD-443D-BE01-CCD0808C29C5}" type="slidenum">
               <a:rPr lang="ru-RU"/>
-              <a:t>7</a:t>
+              <a:t>8</a:t>
             </a:fld>
             <a:endParaRPr lang="ru-RU"/>
           </a:p>
@@ -1379,7 +1379,7 @@
           <a:p>
             <a:fld id="{CB06A0B6-F5BD-443D-BE01-CCD0808C29C5}" type="slidenum">
               <a:rPr lang="ru-RU"/>
-              <a:t>8</a:t>
+              <a:t>9</a:t>
             </a:fld>
             <a:endParaRPr lang="ru-RU"/>
           </a:p>
@@ -1527,7 +1527,7 @@
           <a:p>
             <a:fld id="{F2FFB779-270B-4192-84BA-A697F48306DC}" type="datetimeFigureOut">
               <a:rPr lang="ru-RU" smtClean="0"/>
-              <a:t>06.03.2017</a:t>
+              <a:t>09.03.2017</a:t>
             </a:fld>
             <a:endParaRPr lang="ru-RU"/>
           </a:p>
@@ -1695,7 +1695,7 @@
           <a:p>
             <a:fld id="{F2FFB779-270B-4192-84BA-A697F48306DC}" type="datetimeFigureOut">
               <a:rPr lang="ru-RU" smtClean="0"/>
-              <a:t>06.03.2017</a:t>
+              <a:t>09.03.2017</a:t>
             </a:fld>
             <a:endParaRPr lang="ru-RU"/>
           </a:p>
@@ -1873,7 +1873,7 @@
           <a:p>
             <a:fld id="{F2FFB779-270B-4192-84BA-A697F48306DC}" type="datetimeFigureOut">
               <a:rPr lang="ru-RU" smtClean="0"/>
-              <a:t>06.03.2017</a:t>
+              <a:t>09.03.2017</a:t>
             </a:fld>
             <a:endParaRPr lang="ru-RU"/>
           </a:p>
@@ -2041,7 +2041,7 @@
           <a:p>
             <a:fld id="{F2FFB779-270B-4192-84BA-A697F48306DC}" type="datetimeFigureOut">
               <a:rPr lang="ru-RU" smtClean="0"/>
-              <a:t>06.03.2017</a:t>
+              <a:t>09.03.2017</a:t>
             </a:fld>
             <a:endParaRPr lang="ru-RU"/>
           </a:p>
@@ -2286,7 +2286,7 @@
           <a:p>
             <a:fld id="{F2FFB779-270B-4192-84BA-A697F48306DC}" type="datetimeFigureOut">
               <a:rPr lang="ru-RU" smtClean="0"/>
-              <a:t>06.03.2017</a:t>
+              <a:t>09.03.2017</a:t>
             </a:fld>
             <a:endParaRPr lang="ru-RU"/>
           </a:p>
@@ -2515,7 +2515,7 @@
           <a:p>
             <a:fld id="{F2FFB779-270B-4192-84BA-A697F48306DC}" type="datetimeFigureOut">
               <a:rPr lang="ru-RU" smtClean="0"/>
-              <a:t>06.03.2017</a:t>
+              <a:t>09.03.2017</a:t>
             </a:fld>
             <a:endParaRPr lang="ru-RU"/>
           </a:p>
@@ -2879,7 +2879,7 @@
           <a:p>
             <a:fld id="{F2FFB779-270B-4192-84BA-A697F48306DC}" type="datetimeFigureOut">
               <a:rPr lang="ru-RU" smtClean="0"/>
-              <a:t>06.03.2017</a:t>
+              <a:t>09.03.2017</a:t>
             </a:fld>
             <a:endParaRPr lang="ru-RU"/>
           </a:p>
@@ -2996,7 +2996,7 @@
           <a:p>
             <a:fld id="{F2FFB779-270B-4192-84BA-A697F48306DC}" type="datetimeFigureOut">
               <a:rPr lang="ru-RU" smtClean="0"/>
-              <a:t>06.03.2017</a:t>
+              <a:t>09.03.2017</a:t>
             </a:fld>
             <a:endParaRPr lang="ru-RU"/>
           </a:p>
@@ -3091,7 +3091,7 @@
           <a:p>
             <a:fld id="{F2FFB779-270B-4192-84BA-A697F48306DC}" type="datetimeFigureOut">
               <a:rPr lang="ru-RU" smtClean="0"/>
-              <a:t>06.03.2017</a:t>
+              <a:t>09.03.2017</a:t>
             </a:fld>
             <a:endParaRPr lang="ru-RU"/>
           </a:p>
@@ -3366,7 +3366,7 @@
           <a:p>
             <a:fld id="{F2FFB779-270B-4192-84BA-A697F48306DC}" type="datetimeFigureOut">
               <a:rPr lang="ru-RU" smtClean="0"/>
-              <a:t>06.03.2017</a:t>
+              <a:t>09.03.2017</a:t>
             </a:fld>
             <a:endParaRPr lang="ru-RU"/>
           </a:p>
@@ -3618,7 +3618,7 @@
           <a:p>
             <a:fld id="{F2FFB779-270B-4192-84BA-A697F48306DC}" type="datetimeFigureOut">
               <a:rPr lang="ru-RU" smtClean="0"/>
-              <a:t>06.03.2017</a:t>
+              <a:t>09.03.2017</a:t>
             </a:fld>
             <a:endParaRPr lang="ru-RU"/>
           </a:p>
@@ -3829,7 +3829,7 @@
           <a:p>
             <a:fld id="{F2FFB779-270B-4192-84BA-A697F48306DC}" type="datetimeFigureOut">
               <a:rPr lang="ru-RU" smtClean="0"/>
-              <a:t>06.03.2017</a:t>
+              <a:t>09.03.2017</a:t>
             </a:fld>
             <a:endParaRPr lang="ru-RU"/>
           </a:p>
@@ -4495,6 +4495,106 @@
           </a:p>
         </p:txBody>
       </p:sp>
+      <p:pic>
+        <p:nvPicPr>
+          <p:cNvPr id="3" name="Рисунок 2"/>
+          <p:cNvPicPr>
+            <a:picLocks noChangeAspect="1"/>
+          </p:cNvPicPr>
+          <p:nvPr/>
+        </p:nvPicPr>
+        <p:blipFill>
+          <a:blip r:embed="rId3"/>
+          <a:srcRect l="55818" t="11299" b="16648"/>
+          <a:stretch>
+            <a:fillRect/>
+          </a:stretch>
+        </p:blipFill>
+        <p:spPr>
+          <a:xfrm>
+            <a:off x="1381125" y="1847850"/>
+            <a:ext cx="4036685" cy="3171681"/>
+          </a:xfrm>
+          <a:prstGeom prst="rect">
+            <a:avLst/>
+          </a:prstGeom>
+        </p:spPr>
+      </p:pic>
+      <p:sp>
+        <p:nvSpPr>
+          <p:cNvPr id="4" name="TextBox 3"/>
+          <p:cNvSpPr txBox="1"/>
+          <p:nvPr/>
+        </p:nvSpPr>
+        <p:spPr>
+          <a:xfrm>
+            <a:off x="6052868" y="2652982"/>
+            <a:ext cx="6139171" cy="1568450"/>
+          </a:xfrm>
+          <a:prstGeom prst="rect">
+            <a:avLst/>
+          </a:prstGeom>
+        </p:spPr>
+        <p:txBody>
+          <a:bodyPr rtlCol="0">
+            <a:spAutoFit/>
+          </a:bodyPr>
+          <a:lstStyle/>
+          <a:p>
+            <a:pPr marL="285750" indent="-285750">
+              <a:buFont typeface="Arial" panose="020B0604020202020204" pitchFamily="34" charset="0"/>
+              <a:buChar char="•"/>
+            </a:pPr>
+            <a:r>
+              <a:rPr lang="en-US" sz="2400" dirty="0">
+                <a:solidFill>
+                  <a:srgbClr val="000000"/>
+                </a:solidFill>
+                <a:latin typeface="Calibri"/>
+              </a:rPr>
+              <a:t>Non primary production processes</a:t>
+            </a:r>
+          </a:p>
+          <a:p>
+            <a:pPr marL="285750" indent="-285750">
+              <a:buFont typeface="Arial" panose="020B0604020202020204" pitchFamily="34" charset="0"/>
+              <a:buChar char="•"/>
+            </a:pPr>
+            <a:r>
+              <a:rPr lang="en-US" sz="2400" dirty="0">
+                <a:solidFill>
+                  <a:srgbClr val="000000"/>
+                </a:solidFill>
+                <a:latin typeface="Calibri"/>
+              </a:rPr>
+              <a:t>Service processes</a:t>
+            </a:r>
+          </a:p>
+          <a:p>
+            <a:pPr marL="285750" indent="-285750">
+              <a:buFont typeface="Arial" panose="020B0604020202020204" pitchFamily="34" charset="0"/>
+              <a:buChar char="•"/>
+            </a:pPr>
+            <a:r>
+              <a:rPr lang="en-US" sz="2400" dirty="0">
+                <a:solidFill>
+                  <a:srgbClr val="000000"/>
+                </a:solidFill>
+                <a:latin typeface="Calibri"/>
+              </a:rPr>
+              <a:t>Non-critical business processes</a:t>
+            </a:r>
+          </a:p>
+          <a:p>
+            <a:endParaRPr lang="en-US" sz="2400" dirty="0">
+              <a:solidFill>
+                <a:srgbClr val="000000"/>
+              </a:solidFill>
+              <a:latin typeface="Calibri"/>
+            </a:endParaRPr>
+          </a:p>
+        </p:txBody>
+      </p:sp>
     </p:spTree>
     <p:extLst>
       <p:ext uri="{BB962C8B-B14F-4D97-AF65-F5344CB8AC3E}">
@@ -5073,6 +5173,44 @@
       </p:grpSpPr>
       <p:sp>
         <p:nvSpPr>
+          <p:cNvPr id="12" name="TextBox 11"/>
+          <p:cNvSpPr txBox="1"/>
+          <p:nvPr/>
+        </p:nvSpPr>
+        <p:spPr>
+          <a:xfrm>
+            <a:off x="4772025" y="5057775"/>
+            <a:ext cx="2743200" cy="369332"/>
+          </a:xfrm>
+          <a:prstGeom prst="rect">
+            <a:avLst/>
+          </a:prstGeom>
+        </p:spPr>
+        <p:txBody>
+          <a:bodyPr rtlCol="0">
+            <a:spAutoFit/>
+          </a:bodyPr>
+          <a:lstStyle/>
+          <a:p>
+            <a:pPr algn="ctr"/>
+            <a:r>
+              <a:rPr lang="ru-RU" dirty="0" err="1"/>
+              <a:t>Smart</a:t>
+            </a:r>
+            <a:r>
+              <a:rPr lang="ru-RU" dirty="0"/>
+              <a:t> </a:t>
+            </a:r>
+            <a:r>
+              <a:rPr lang="ru-RU" dirty="0" err="1"/>
+              <a:t>materials</a:t>
+            </a:r>
+            <a:endParaRPr lang="ru-RU"/>
+          </a:p>
+        </p:txBody>
+      </p:sp>
+      <p:sp>
+        <p:nvSpPr>
           <p:cNvPr id="2" name="Заголовок 1"/>
           <p:cNvSpPr>
             <a:spLocks noGrp="1"/>
@@ -5081,18 +5219,24 @@
             <p:ph type="title"/>
           </p:nvPr>
         </p:nvSpPr>
-        <p:spPr/>
+        <p:spPr>
+          <a:xfrm>
+            <a:off x="1055857" y="152400"/>
+            <a:ext cx="10515600" cy="1142462"/>
+          </a:xfrm>
+        </p:spPr>
         <p:txBody>
           <a:bodyPr>
-            <a:normAutofit fontScale="90000"/>
+            <a:noAutofit/>
           </a:bodyPr>
           <a:lstStyle/>
           <a:p>
-            <a:r>
-              <a:rPr lang="en-US" dirty="0"/>
+            <a:pPr algn="just"/>
+            <a:r>
+              <a:rPr lang="en-US" sz="2400" dirty="0"/>
               <a:t>Mapping above to generalized business processes of production plant we see possible applications for I4.0 at production plant </a:t>
             </a:r>
-            <a:endParaRPr lang="en-US" dirty="0">
+            <a:endParaRPr lang="en-US" sz="2400" dirty="0">
               <a:solidFill>
                 <a:srgbClr val="000000"/>
               </a:solidFill>
@@ -5117,8 +5261,680 @@
         </p:blipFill>
         <p:spPr>
           <a:xfrm>
-            <a:off x="1076325" y="2085975"/>
+            <a:off x="962025" y="1171575"/>
             <a:ext cx="10223037" cy="3715104"/>
+          </a:xfrm>
+          <a:prstGeom prst="rect">
+            <a:avLst/>
+          </a:prstGeom>
+        </p:spPr>
+      </p:pic>
+      <p:pic>
+        <p:nvPicPr>
+          <p:cNvPr id="3" name="Рисунок 2"/>
+          <p:cNvPicPr>
+            <a:picLocks noChangeAspect="1"/>
+          </p:cNvPicPr>
+          <p:nvPr/>
+        </p:nvPicPr>
+        <p:blipFill>
+          <a:blip r:embed="rId4"/>
+          <a:stretch>
+            <a:fillRect/>
+          </a:stretch>
+        </p:blipFill>
+        <p:spPr>
+          <a:xfrm>
+            <a:off x="1333500" y="5057775"/>
+            <a:ext cx="814034" cy="540275"/>
+          </a:xfrm>
+          <a:prstGeom prst="rect">
+            <a:avLst/>
+          </a:prstGeom>
+        </p:spPr>
+      </p:pic>
+      <p:pic>
+        <p:nvPicPr>
+          <p:cNvPr id="5" name="Рисунок 4"/>
+          <p:cNvPicPr>
+            <a:picLocks noChangeAspect="1"/>
+          </p:cNvPicPr>
+          <p:nvPr/>
+        </p:nvPicPr>
+        <p:blipFill>
+          <a:blip r:embed="rId5"/>
+          <a:stretch>
+            <a:fillRect/>
+          </a:stretch>
+        </p:blipFill>
+        <p:spPr>
+          <a:xfrm>
+            <a:off x="7362825" y="5067300"/>
+            <a:ext cx="919409" cy="615933"/>
+          </a:xfrm>
+          <a:prstGeom prst="rect">
+            <a:avLst/>
+          </a:prstGeom>
+        </p:spPr>
+      </p:pic>
+      <p:pic>
+        <p:nvPicPr>
+          <p:cNvPr id="6" name="Рисунок 5"/>
+          <p:cNvPicPr>
+            <a:picLocks noChangeAspect="1"/>
+          </p:cNvPicPr>
+          <p:nvPr/>
+        </p:nvPicPr>
+        <p:blipFill>
+          <a:blip r:embed="rId6"/>
+          <a:stretch>
+            <a:fillRect/>
+          </a:stretch>
+        </p:blipFill>
+        <p:spPr>
+          <a:xfrm>
+            <a:off x="4552950" y="5057775"/>
+            <a:ext cx="812877" cy="540406"/>
+          </a:xfrm>
+          <a:prstGeom prst="rect">
+            <a:avLst/>
+          </a:prstGeom>
+        </p:spPr>
+      </p:pic>
+      <p:pic>
+        <p:nvPicPr>
+          <p:cNvPr id="7" name="Рисунок 6"/>
+          <p:cNvPicPr>
+            <a:picLocks noChangeAspect="1"/>
+          </p:cNvPicPr>
+          <p:nvPr/>
+        </p:nvPicPr>
+        <p:blipFill>
+          <a:blip r:embed="rId7"/>
+          <a:stretch>
+            <a:fillRect/>
+          </a:stretch>
+        </p:blipFill>
+        <p:spPr>
+          <a:xfrm>
+            <a:off x="2152650" y="5753100"/>
+            <a:ext cx="833919" cy="552318"/>
+          </a:xfrm>
+          <a:prstGeom prst="rect">
+            <a:avLst/>
+          </a:prstGeom>
+        </p:spPr>
+      </p:pic>
+      <p:pic>
+        <p:nvPicPr>
+          <p:cNvPr id="8" name="Рисунок 7"/>
+          <p:cNvPicPr>
+            <a:picLocks noChangeAspect="1"/>
+          </p:cNvPicPr>
+          <p:nvPr/>
+        </p:nvPicPr>
+        <p:blipFill>
+          <a:blip r:embed="rId8"/>
+          <a:stretch>
+            <a:fillRect/>
+          </a:stretch>
+        </p:blipFill>
+        <p:spPr>
+          <a:xfrm>
+            <a:off x="4867275" y="5753100"/>
+            <a:ext cx="816716" cy="542029"/>
+          </a:xfrm>
+          <a:prstGeom prst="rect">
+            <a:avLst/>
+          </a:prstGeom>
+        </p:spPr>
+      </p:pic>
+      <p:pic>
+        <p:nvPicPr>
+          <p:cNvPr id="9" name="Рисунок 8"/>
+          <p:cNvPicPr>
+            <a:picLocks noChangeAspect="1"/>
+          </p:cNvPicPr>
+          <p:nvPr/>
+        </p:nvPicPr>
+        <p:blipFill>
+          <a:blip r:embed="rId9"/>
+          <a:stretch>
+            <a:fillRect/>
+          </a:stretch>
+        </p:blipFill>
+        <p:spPr>
+          <a:xfrm>
+            <a:off x="7753350" y="5686425"/>
+            <a:ext cx="937203" cy="624285"/>
+          </a:xfrm>
+          <a:prstGeom prst="rect">
+            <a:avLst/>
+          </a:prstGeom>
+        </p:spPr>
+      </p:pic>
+      <p:pic>
+        <p:nvPicPr>
+          <p:cNvPr id="10" name="Рисунок 9"/>
+          <p:cNvPicPr>
+            <a:picLocks noChangeAspect="1"/>
+          </p:cNvPicPr>
+          <p:nvPr/>
+        </p:nvPicPr>
+        <p:blipFill>
+          <a:blip r:embed="rId10"/>
+          <a:stretch>
+            <a:fillRect/>
+          </a:stretch>
+        </p:blipFill>
+        <p:spPr>
+          <a:xfrm>
+            <a:off x="10191750" y="5324475"/>
+            <a:ext cx="824382" cy="554257"/>
+          </a:xfrm>
+          <a:prstGeom prst="rect">
+            <a:avLst/>
+          </a:prstGeom>
+        </p:spPr>
+      </p:pic>
+      <p:sp>
+        <p:nvSpPr>
+          <p:cNvPr id="11" name="TextBox 10"/>
+          <p:cNvSpPr txBox="1"/>
+          <p:nvPr/>
+        </p:nvSpPr>
+        <p:spPr>
+          <a:xfrm>
+            <a:off x="5172075" y="5734050"/>
+            <a:ext cx="1944902" cy="368300"/>
+          </a:xfrm>
+          <a:prstGeom prst="rect">
+            <a:avLst/>
+          </a:prstGeom>
+        </p:spPr>
+        <p:txBody>
+          <a:bodyPr rtlCol="0">
+            <a:spAutoFit/>
+          </a:bodyPr>
+          <a:lstStyle/>
+          <a:p>
+            <a:pPr algn="ctr"/>
+            <a:r>
+              <a:rPr lang="ru-RU" dirty="0" err="1"/>
+              <a:t>Cobots</a:t>
+            </a:r>
+            <a:endParaRPr lang="ru-RU"/>
+          </a:p>
+        </p:txBody>
+      </p:sp>
+      <p:sp>
+        <p:nvSpPr>
+          <p:cNvPr id="13" name="TextBox 12"/>
+          <p:cNvSpPr txBox="1"/>
+          <p:nvPr/>
+        </p:nvSpPr>
+        <p:spPr>
+          <a:xfrm>
+            <a:off x="2647950" y="5591175"/>
+            <a:ext cx="2126283" cy="646331"/>
+          </a:xfrm>
+          <a:prstGeom prst="rect">
+            <a:avLst/>
+          </a:prstGeom>
+        </p:spPr>
+        <p:txBody>
+          <a:bodyPr rtlCol="0">
+            <a:spAutoFit/>
+          </a:bodyPr>
+          <a:lstStyle/>
+          <a:p>
+            <a:pPr algn="ctr"/>
+            <a:r>
+              <a:rPr lang="ru-RU" dirty="0" err="1"/>
+              <a:t>Predictive</a:t>
+            </a:r>
+            <a:r>
+              <a:rPr lang="ru-RU" dirty="0"/>
+              <a:t> </a:t>
+            </a:r>
+            <a:r>
+              <a:rPr lang="ru-RU" dirty="0" err="1"/>
+              <a:t>Maintenance</a:t>
+            </a:r>
+            <a:endParaRPr lang="ru-RU"/>
+          </a:p>
+        </p:txBody>
+      </p:sp>
+      <p:sp>
+        <p:nvSpPr>
+          <p:cNvPr id="14" name="TextBox 13"/>
+          <p:cNvSpPr txBox="1"/>
+          <p:nvPr/>
+        </p:nvSpPr>
+        <p:spPr>
+          <a:xfrm>
+            <a:off x="1476375" y="5076825"/>
+            <a:ext cx="2743200" cy="369332"/>
+          </a:xfrm>
+          <a:prstGeom prst="rect">
+            <a:avLst/>
+          </a:prstGeom>
+        </p:spPr>
+        <p:txBody>
+          <a:bodyPr rtlCol="0">
+            <a:spAutoFit/>
+          </a:bodyPr>
+          <a:lstStyle/>
+          <a:p>
+            <a:pPr algn="ctr"/>
+            <a:r>
+              <a:rPr lang="ru-RU" dirty="0"/>
+              <a:t>CPS </a:t>
+            </a:r>
+            <a:r>
+              <a:rPr lang="ru-RU" dirty="0" err="1"/>
+              <a:t>Interaction</a:t>
+            </a:r>
+            <a:endParaRPr lang="ru-RU"/>
+          </a:p>
+        </p:txBody>
+      </p:sp>
+      <p:sp>
+        <p:nvSpPr>
+          <p:cNvPr id="15" name="TextBox 14"/>
+          <p:cNvSpPr txBox="1"/>
+          <p:nvPr/>
+        </p:nvSpPr>
+        <p:spPr>
+          <a:xfrm>
+            <a:off x="7753350" y="5057775"/>
+            <a:ext cx="2743200" cy="369332"/>
+          </a:xfrm>
+          <a:prstGeom prst="rect">
+            <a:avLst/>
+          </a:prstGeom>
+        </p:spPr>
+        <p:txBody>
+          <a:bodyPr rtlCol="0">
+            <a:spAutoFit/>
+          </a:bodyPr>
+          <a:lstStyle/>
+          <a:p>
+            <a:pPr algn="ctr"/>
+            <a:r>
+              <a:rPr lang="ru-RU" dirty="0" err="1"/>
+              <a:t>Integrated</a:t>
+            </a:r>
+            <a:r>
+              <a:rPr lang="ru-RU" dirty="0"/>
+              <a:t> </a:t>
+            </a:r>
+            <a:r>
+              <a:rPr lang="ru-RU" dirty="0" err="1"/>
+              <a:t>Energy</a:t>
+            </a:r>
+            <a:endParaRPr lang="ru-RU"/>
+          </a:p>
+        </p:txBody>
+      </p:sp>
+      <p:sp>
+        <p:nvSpPr>
+          <p:cNvPr id="16" name="TextBox 15"/>
+          <p:cNvSpPr txBox="1"/>
+          <p:nvPr/>
+        </p:nvSpPr>
+        <p:spPr>
+          <a:xfrm>
+            <a:off x="8315325" y="5610225"/>
+            <a:ext cx="1746536" cy="646331"/>
+          </a:xfrm>
+          <a:prstGeom prst="rect">
+            <a:avLst/>
+          </a:prstGeom>
+        </p:spPr>
+        <p:txBody>
+          <a:bodyPr rtlCol="0">
+            <a:spAutoFit/>
+          </a:bodyPr>
+          <a:lstStyle/>
+          <a:p>
+            <a:pPr algn="ctr"/>
+            <a:r>
+              <a:rPr lang="ru-RU" dirty="0" err="1"/>
+              <a:t>Energy</a:t>
+            </a:r>
+            <a:r>
+              <a:rPr lang="ru-RU" dirty="0"/>
+              <a:t> </a:t>
+            </a:r>
+            <a:r>
+              <a:rPr lang="ru-RU" dirty="0" err="1"/>
+              <a:t>Efficiency</a:t>
+            </a:r>
+            <a:endParaRPr lang="ru-RU"/>
+          </a:p>
+        </p:txBody>
+      </p:sp>
+      <p:sp>
+        <p:nvSpPr>
+          <p:cNvPr id="17" name="TextBox 16"/>
+          <p:cNvSpPr txBox="1"/>
+          <p:nvPr/>
+        </p:nvSpPr>
+        <p:spPr>
+          <a:xfrm>
+            <a:off x="10877550" y="5229225"/>
+            <a:ext cx="1022768" cy="646331"/>
+          </a:xfrm>
+          <a:prstGeom prst="rect">
+            <a:avLst/>
+          </a:prstGeom>
+        </p:spPr>
+        <p:txBody>
+          <a:bodyPr rtlCol="0">
+            <a:spAutoFit/>
+          </a:bodyPr>
+          <a:lstStyle/>
+          <a:p>
+            <a:pPr algn="ctr"/>
+            <a:r>
+              <a:rPr lang="ru-RU" dirty="0" err="1"/>
+              <a:t>Digital</a:t>
+            </a:r>
+            <a:r>
+              <a:rPr lang="ru-RU" dirty="0"/>
+              <a:t> </a:t>
+            </a:r>
+            <a:r>
+              <a:rPr lang="ru-RU" dirty="0" err="1"/>
+              <a:t>Twins</a:t>
+            </a:r>
+            <a:endParaRPr lang="ru-RU"/>
+          </a:p>
+        </p:txBody>
+      </p:sp>
+      <p:pic>
+        <p:nvPicPr>
+          <p:cNvPr id="18" name="Рисунок 17"/>
+          <p:cNvPicPr>
+            <a:picLocks noChangeAspect="1"/>
+          </p:cNvPicPr>
+          <p:nvPr/>
+        </p:nvPicPr>
+        <p:blipFill>
+          <a:blip r:embed="rId10"/>
+          <a:stretch>
+            <a:fillRect/>
+          </a:stretch>
+        </p:blipFill>
+        <p:spPr>
+          <a:xfrm>
+            <a:off x="8620125" y="3019425"/>
+            <a:ext cx="846138" cy="571500"/>
+          </a:xfrm>
+          <a:prstGeom prst="rect">
+            <a:avLst/>
+          </a:prstGeom>
+        </p:spPr>
+      </p:pic>
+      <p:pic>
+        <p:nvPicPr>
+          <p:cNvPr id="19" name="Рисунок 18"/>
+          <p:cNvPicPr>
+            <a:picLocks noChangeAspect="1"/>
+          </p:cNvPicPr>
+          <p:nvPr/>
+        </p:nvPicPr>
+        <p:blipFill>
+          <a:blip r:embed="rId10"/>
+          <a:stretch>
+            <a:fillRect/>
+          </a:stretch>
+        </p:blipFill>
+        <p:spPr>
+          <a:xfrm>
+            <a:off x="3505200" y="2638425"/>
+            <a:ext cx="724039" cy="487456"/>
+          </a:xfrm>
+          <a:prstGeom prst="rect">
+            <a:avLst/>
+          </a:prstGeom>
+        </p:spPr>
+      </p:pic>
+      <p:pic>
+        <p:nvPicPr>
+          <p:cNvPr id="20" name="Рисунок 19"/>
+          <p:cNvPicPr>
+            <a:picLocks noChangeAspect="1"/>
+          </p:cNvPicPr>
+          <p:nvPr/>
+        </p:nvPicPr>
+        <p:blipFill>
+          <a:blip r:embed="rId10"/>
+          <a:stretch>
+            <a:fillRect/>
+          </a:stretch>
+        </p:blipFill>
+        <p:spPr>
+          <a:xfrm>
+            <a:off x="2314575" y="1533525"/>
+            <a:ext cx="498522" cy="354013"/>
+          </a:xfrm>
+          <a:prstGeom prst="rect">
+            <a:avLst/>
+          </a:prstGeom>
+        </p:spPr>
+      </p:pic>
+      <p:pic>
+        <p:nvPicPr>
+          <p:cNvPr id="21" name="Рисунок 20"/>
+          <p:cNvPicPr>
+            <a:picLocks noChangeAspect="1"/>
+          </p:cNvPicPr>
+          <p:nvPr/>
+        </p:nvPicPr>
+        <p:blipFill>
+          <a:blip r:embed="rId10"/>
+          <a:stretch>
+            <a:fillRect/>
+          </a:stretch>
+        </p:blipFill>
+        <p:spPr>
+          <a:xfrm>
+            <a:off x="9153525" y="2286000"/>
+            <a:ext cx="824382" cy="554257"/>
+          </a:xfrm>
+          <a:prstGeom prst="rect">
+            <a:avLst/>
+          </a:prstGeom>
+        </p:spPr>
+      </p:pic>
+      <p:pic>
+        <p:nvPicPr>
+          <p:cNvPr id="22" name="Рисунок 21"/>
+          <p:cNvPicPr>
+            <a:picLocks noChangeAspect="1"/>
+          </p:cNvPicPr>
+          <p:nvPr/>
+        </p:nvPicPr>
+        <p:blipFill>
+          <a:blip r:embed="rId9"/>
+          <a:stretch>
+            <a:fillRect/>
+          </a:stretch>
+        </p:blipFill>
+        <p:spPr>
+          <a:xfrm>
+            <a:off x="4276725" y="2638425"/>
+            <a:ext cx="727985" cy="486449"/>
+          </a:xfrm>
+          <a:prstGeom prst="rect">
+            <a:avLst/>
+          </a:prstGeom>
+        </p:spPr>
+      </p:pic>
+      <p:pic>
+        <p:nvPicPr>
+          <p:cNvPr id="23" name="Рисунок 22"/>
+          <p:cNvPicPr>
+            <a:picLocks noChangeAspect="1"/>
+          </p:cNvPicPr>
+          <p:nvPr/>
+        </p:nvPicPr>
+        <p:blipFill>
+          <a:blip r:embed="rId7"/>
+          <a:stretch>
+            <a:fillRect/>
+          </a:stretch>
+        </p:blipFill>
+        <p:spPr>
+          <a:xfrm>
+            <a:off x="8201025" y="4019550"/>
+            <a:ext cx="529609" cy="353335"/>
+          </a:xfrm>
+          <a:prstGeom prst="rect">
+            <a:avLst/>
+          </a:prstGeom>
+        </p:spPr>
+      </p:pic>
+      <p:pic>
+        <p:nvPicPr>
+          <p:cNvPr id="24" name="Рисунок 23"/>
+          <p:cNvPicPr>
+            <a:picLocks noChangeAspect="1"/>
+          </p:cNvPicPr>
+          <p:nvPr/>
+        </p:nvPicPr>
+        <p:blipFill>
+          <a:blip r:embed="rId6"/>
+          <a:stretch>
+            <a:fillRect/>
+          </a:stretch>
+        </p:blipFill>
+        <p:spPr>
+          <a:xfrm>
+            <a:off x="5229225" y="4019550"/>
+            <a:ext cx="530365" cy="350157"/>
+          </a:xfrm>
+          <a:prstGeom prst="rect">
+            <a:avLst/>
+          </a:prstGeom>
+        </p:spPr>
+      </p:pic>
+      <p:pic>
+        <p:nvPicPr>
+          <p:cNvPr id="25" name="Рисунок 24"/>
+          <p:cNvPicPr>
+            <a:picLocks noChangeAspect="1"/>
+          </p:cNvPicPr>
+          <p:nvPr/>
+        </p:nvPicPr>
+        <p:blipFill>
+          <a:blip r:embed="rId4"/>
+          <a:stretch>
+            <a:fillRect/>
+          </a:stretch>
+        </p:blipFill>
+        <p:spPr>
+          <a:xfrm>
+            <a:off x="7515225" y="2305050"/>
+            <a:ext cx="815257" cy="541245"/>
+          </a:xfrm>
+          <a:prstGeom prst="rect">
+            <a:avLst/>
+          </a:prstGeom>
+        </p:spPr>
+      </p:pic>
+      <p:pic>
+        <p:nvPicPr>
+          <p:cNvPr id="26" name="Рисунок 25"/>
+          <p:cNvPicPr>
+            <a:picLocks noChangeAspect="1"/>
+          </p:cNvPicPr>
+          <p:nvPr/>
+        </p:nvPicPr>
+        <p:blipFill>
+          <a:blip r:embed="rId8"/>
+          <a:stretch>
+            <a:fillRect/>
+          </a:stretch>
+        </p:blipFill>
+        <p:spPr>
+          <a:xfrm>
+            <a:off x="8277225" y="2305050"/>
+            <a:ext cx="816716" cy="542029"/>
+          </a:xfrm>
+          <a:prstGeom prst="rect">
+            <a:avLst/>
+          </a:prstGeom>
+        </p:spPr>
+      </p:pic>
+      <p:pic>
+        <p:nvPicPr>
+          <p:cNvPr id="27" name="Рисунок 26"/>
+          <p:cNvPicPr>
+            <a:picLocks noChangeAspect="1"/>
+          </p:cNvPicPr>
+          <p:nvPr/>
+        </p:nvPicPr>
+        <p:blipFill>
+          <a:blip r:embed="rId8"/>
+          <a:stretch>
+            <a:fillRect/>
+          </a:stretch>
+        </p:blipFill>
+        <p:spPr>
+          <a:xfrm>
+            <a:off x="7258050" y="4019550"/>
+            <a:ext cx="520400" cy="341406"/>
+          </a:xfrm>
+          <a:prstGeom prst="rect">
+            <a:avLst/>
+          </a:prstGeom>
+        </p:spPr>
+      </p:pic>
+      <p:pic>
+        <p:nvPicPr>
+          <p:cNvPr id="28" name="Рисунок 27"/>
+          <p:cNvPicPr>
+            <a:picLocks noChangeAspect="1"/>
+          </p:cNvPicPr>
+          <p:nvPr/>
+        </p:nvPicPr>
+        <p:blipFill>
+          <a:blip r:embed="rId8"/>
+          <a:stretch>
+            <a:fillRect/>
+          </a:stretch>
+        </p:blipFill>
+        <p:spPr>
+          <a:xfrm>
+            <a:off x="8791575" y="4019550"/>
+            <a:ext cx="517941" cy="341591"/>
+          </a:xfrm>
+          <a:prstGeom prst="rect">
+            <a:avLst/>
+          </a:prstGeom>
+        </p:spPr>
+      </p:pic>
+      <p:pic>
+        <p:nvPicPr>
+          <p:cNvPr id="29" name="Рисунок 28"/>
+          <p:cNvPicPr>
+            <a:picLocks noChangeAspect="1"/>
+          </p:cNvPicPr>
+          <p:nvPr/>
+        </p:nvPicPr>
+        <p:blipFill>
+          <a:blip r:embed="rId9"/>
+          <a:stretch>
+            <a:fillRect/>
+          </a:stretch>
+        </p:blipFill>
+        <p:spPr>
+          <a:xfrm>
+            <a:off x="10058400" y="2286000"/>
+            <a:ext cx="784918" cy="524014"/>
           </a:xfrm>
           <a:prstGeom prst="rect">
             <a:avLst/>

</xml_diff>